<commit_message>
Dokumentation und Präsentation Update
</commit_message>
<xml_diff>
--- a/Project-management/999. Abschlusspräsentation/Abschlusspräsentation 25.02.2025 HomeSphere.pptx
+++ b/Project-management/999. Abschlusspräsentation/Abschlusspräsentation 25.02.2025 HomeSphere.pptx
@@ -142,7 +142,7 @@
   <pc:docChgLst>
     <pc:chgData name="Wörndle Linus" userId="e99df0f2-d3c7-483b-b111-e87b6efc6f80" providerId="ADAL" clId="{6FC34448-27DE-4F46-AB60-9D3B18F64782}"/>
     <pc:docChg chg="undo custSel addSld delSld modSld sldOrd">
-      <pc:chgData name="Wörndle Linus" userId="e99df0f2-d3c7-483b-b111-e87b6efc6f80" providerId="ADAL" clId="{6FC34448-27DE-4F46-AB60-9D3B18F64782}" dt="2025-02-25T20:31:16.064" v="3163"/>
+      <pc:chgData name="Wörndle Linus" userId="e99df0f2-d3c7-483b-b111-e87b6efc6f80" providerId="ADAL" clId="{6FC34448-27DE-4F46-AB60-9D3B18F64782}" dt="2025-02-25T21:54:36.893" v="3194" actId="20577"/>
       <pc:docMkLst>
         <pc:docMk/>
       </pc:docMkLst>
@@ -289,13 +289,13 @@
         </pc:cxnChg>
       </pc:sldChg>
       <pc:sldChg chg="addSp delSp modSp new mod modTransition setBg">
-        <pc:chgData name="Wörndle Linus" userId="e99df0f2-d3c7-483b-b111-e87b6efc6f80" providerId="ADAL" clId="{6FC34448-27DE-4F46-AB60-9D3B18F64782}" dt="2025-02-25T20:31:16.064" v="3163"/>
+        <pc:chgData name="Wörndle Linus" userId="e99df0f2-d3c7-483b-b111-e87b6efc6f80" providerId="ADAL" clId="{6FC34448-27DE-4F46-AB60-9D3B18F64782}" dt="2025-02-25T21:54:36.893" v="3194" actId="20577"/>
         <pc:sldMkLst>
           <pc:docMk/>
           <pc:sldMk cId="3464076384" sldId="258"/>
         </pc:sldMkLst>
         <pc:spChg chg="mod">
-          <ac:chgData name="Wörndle Linus" userId="e99df0f2-d3c7-483b-b111-e87b6efc6f80" providerId="ADAL" clId="{6FC34448-27DE-4F46-AB60-9D3B18F64782}" dt="2025-02-25T14:54:44.228" v="377" actId="404"/>
+          <ac:chgData name="Wörndle Linus" userId="e99df0f2-d3c7-483b-b111-e87b6efc6f80" providerId="ADAL" clId="{6FC34448-27DE-4F46-AB60-9D3B18F64782}" dt="2025-02-25T21:54:36.893" v="3194" actId="20577"/>
           <ac:spMkLst>
             <pc:docMk/>
             <pc:sldMk cId="3464076384" sldId="258"/>
@@ -790,8 +790,8 @@
           </ac:picMkLst>
         </pc:picChg>
       </pc:sldChg>
-      <pc:sldChg chg="addSp modSp new modTransition">
-        <pc:chgData name="Wörndle Linus" userId="e99df0f2-d3c7-483b-b111-e87b6efc6f80" providerId="ADAL" clId="{6FC34448-27DE-4F46-AB60-9D3B18F64782}" dt="2025-02-25T20:31:16.064" v="3163"/>
+      <pc:sldChg chg="addSp modSp new mod modTransition">
+        <pc:chgData name="Wörndle Linus" userId="e99df0f2-d3c7-483b-b111-e87b6efc6f80" providerId="ADAL" clId="{6FC34448-27DE-4F46-AB60-9D3B18F64782}" dt="2025-02-25T21:53:51.608" v="3164" actId="20577"/>
         <pc:sldMkLst>
           <pc:docMk/>
           <pc:sldMk cId="3700679763" sldId="275"/>
@@ -805,7 +805,7 @@
           </ac:spMkLst>
         </pc:spChg>
         <pc:spChg chg="add mod">
-          <ac:chgData name="Wörndle Linus" userId="e99df0f2-d3c7-483b-b111-e87b6efc6f80" providerId="ADAL" clId="{6FC34448-27DE-4F46-AB60-9D3B18F64782}" dt="2025-02-25T20:25:40.149" v="3142"/>
+          <ac:chgData name="Wörndle Linus" userId="e99df0f2-d3c7-483b-b111-e87b6efc6f80" providerId="ADAL" clId="{6FC34448-27DE-4F46-AB60-9D3B18F64782}" dt="2025-02-25T21:53:51.608" v="3164" actId="20577"/>
           <ac:spMkLst>
             <pc:docMk/>
             <pc:sldMk cId="3700679763" sldId="275"/>
@@ -7898,7 +7898,7 @@
             <a:pPr algn="ctr"/>
             <a:r>
               <a:rPr lang="de-DE" dirty="0"/>
-              <a:t>Gerne beantworte wir jetzt Ihre Fragen.</a:t>
+              <a:t>Gerne beantworten wir jetzt Ihre Fragen.</a:t>
             </a:r>
             <a:endParaRPr lang="de-AT" dirty="0"/>
           </a:p>
@@ -8626,7 +8626,7 @@
             <a:pPr algn="ctr"/>
             <a:r>
               <a:rPr lang="de-AT" sz="4400" noProof="0" dirty="0"/>
-              <a:t>EINLEITUNG INS PROJEKT</a:t>
+              <a:t>Einleitung ins Projekt</a:t>
             </a:r>
           </a:p>
         </p:txBody>

</xml_diff>